<commit_message>
Notes fertig für Präsi
</commit_message>
<xml_diff>
--- a/Zwischenpräsentation.pptx
+++ b/Zwischenpräsentation.pptx
@@ -4398,7 +4398,7 @@
       <dgm:spPr/>
     </dgm:pt>
     <dgm:pt modelId="{AEAD57E8-9E0B-4EEF-9A9A-3E7351F08F0D}" type="pres">
-      <dgm:prSet presAssocID="{A7C29121-FD6B-4B4B-9EC7-E3359C04ECBF}" presName="parentNode" presStyleLbl="revTx" presStyleIdx="2" presStyleCnt="5" custScaleX="113233" custScaleY="57496" custLinFactNeighborX="15036" custLinFactNeighborY="-31505">
+      <dgm:prSet presAssocID="{A7C29121-FD6B-4B4B-9EC7-E3359C04ECBF}" presName="parentNode" presStyleLbl="revTx" presStyleIdx="2" presStyleCnt="5" custScaleX="113233" custScaleY="57496" custLinFactNeighborX="-3864" custLinFactNeighborY="-32343">
         <dgm:presLayoutVars>
           <dgm:chMax val="0"/>
           <dgm:bulletEnabled val="1"/>
@@ -4763,7 +4763,10 @@
             <a:rPr lang="de-DE" sz="1000" dirty="0" err="1"/>
             <a:t>Recommender</a:t>
           </a:r>
-          <a:endParaRPr lang="de-DE" sz="1000" dirty="0"/>
+          <a:r>
+            <a:rPr lang="de-DE" sz="1000" dirty="0"/>
+            <a:t> System</a:t>
+          </a:r>
         </a:p>
       </dgm:t>
     </dgm:pt>
@@ -6935,7 +6938,7 @@
       </dsp:nvSpPr>
       <dsp:spPr>
         <a:xfrm rot="16200000">
-          <a:off x="3521232" y="1660096"/>
+          <a:off x="3465241" y="1628449"/>
           <a:ext cx="2171283" cy="335450"/>
         </a:xfrm>
         <a:prstGeom prst="rect">
@@ -6988,7 +6991,7 @@
         </a:p>
       </dsp:txBody>
       <dsp:txXfrm>
-        <a:off x="3521232" y="1660096"/>
+        <a:off x="3465241" y="1628449"/>
         <a:ext cx="2171283" cy="335450"/>
       </dsp:txXfrm>
     </dsp:sp>
@@ -7786,7 +7789,10 @@
             <a:rPr lang="de-DE" sz="1000" kern="1200" dirty="0" err="1"/>
             <a:t>Recommender</a:t>
           </a:r>
-          <a:endParaRPr lang="de-DE" sz="1000" kern="1200" dirty="0"/>
+          <a:r>
+            <a:rPr lang="de-DE" sz="1000" kern="1200" dirty="0"/>
+            <a:t> System</a:t>
+          </a:r>
         </a:p>
       </dsp:txBody>
       <dsp:txXfrm>
@@ -13528,7 +13534,7 @@
           <a:p>
             <a:fld id="{C6AC6211-610F-44E5-BF19-D3CDF6EDD281}" type="datetimeFigureOut">
               <a:rPr lang="de-DE" smtClean="0"/>
-              <a:t>12.01.2023</a:t>
+              <a:t>14.01.2023</a:t>
             </a:fld>
             <a:endParaRPr lang="de-DE"/>
           </a:p>
@@ -13694,7 +13700,7 @@
           <a:p>
             <a:fld id="{347435D3-23A6-45D3-8DFA-7317DC1E7A64}" type="datetimeFigureOut">
               <a:rPr lang="de-DE" smtClean="0"/>
-              <a:t>12.01.2023</a:t>
+              <a:t>14.01.2023</a:t>
             </a:fld>
             <a:endParaRPr lang="de-DE"/>
           </a:p>
@@ -16238,7 +16244,7 @@
           <a:p>
             <a:fld id="{4771D386-8A79-4311-8C22-2E64011E473F}" type="datetime1">
               <a:rPr lang="de-LU" smtClean="0"/>
-              <a:t>12.01.2023</a:t>
+              <a:t>14.01.2023</a:t>
             </a:fld>
             <a:endParaRPr lang="de-LU" dirty="0"/>
           </a:p>
@@ -23002,7 +23008,7 @@
           <p:nvPr>
             <p:extLst>
               <p:ext uri="{D42A27DB-BD31-4B8C-83A1-F6EECF244321}">
-                <p14:modId xmlns:p14="http://schemas.microsoft.com/office/powerpoint/2010/main" val="1889275175"/>
+                <p14:modId xmlns:p14="http://schemas.microsoft.com/office/powerpoint/2010/main" val="3406549259"/>
               </p:ext>
             </p:extLst>
           </p:nvPr>
@@ -25677,7 +25683,7 @@
           <p:nvPr>
             <p:extLst>
               <p:ext uri="{D42A27DB-BD31-4B8C-83A1-F6EECF244321}">
-                <p14:modId xmlns:p14="http://schemas.microsoft.com/office/powerpoint/2010/main" val="4127260365"/>
+                <p14:modId xmlns:p14="http://schemas.microsoft.com/office/powerpoint/2010/main" val="3963897597"/>
               </p:ext>
             </p:extLst>
           </p:nvPr>

</xml_diff>